<commit_message>
a few more notes
</commit_message>
<xml_diff>
--- a/ML with R and Azure.pptx
+++ b/ML with R and Azure.pptx
@@ -1173,9 +1173,9 @@
               <a:buNone/>
             </a:pPr>
             <a:r>
-              <a:t/>
+              <a:rPr lang="en"/>
+              <a:t>Slides from OSM State of the Map.. Notice the title and the last slide..of the first one... The second one is mostly Facebook engineers... at least 50 people.</a:t>
             </a:r>
-            <a:endParaRPr/>
           </a:p>
         </p:txBody>
       </p:sp>
@@ -2142,19 +2142,7 @@
             </a:pPr>
             <a:r>
               <a:rPr lang="en"/>
-              <a:t>R is THE Standard. But I used Classification tutorials and tried to convert them to my linear needs.. Perhaps if I’d started w/ a linear tutorial. (My Rsquared is very bad)</a:t>
-            </a:r>
-          </a:p>
-          <a:p>
-            <a:pPr lvl="0">
-              <a:spcBef>
-                <a:spcPts val="0"/>
-              </a:spcBef>
-              <a:buNone/>
-            </a:pPr>
-            <a:r>
-              <a:rPr lang="en"/>
-              <a:t>ArcGIS and Azure both offer options to pull in R scripts.</a:t>
+              <a:t>R is THE Standard. But I used Classification tutorials and tried to convert them to my linear needs.. Perhaps if I’d started w/ a linear tutorial.ArcGIS and Azure both offer options to pull in R scripts.</a:t>
             </a:r>
           </a:p>
           <a:p>
@@ -14527,6 +14515,7 @@
               <a:spcAft>
                 <a:spcPts val="0"/>
               </a:spcAft>
+              <a:buSzPct val="100000"/>
               <a:buChar char="-"/>
             </a:pPr>
             <a:r>
@@ -14542,6 +14531,7 @@
               <a:spcAft>
                 <a:spcPts val="0"/>
               </a:spcAft>
+              <a:buSzPct val="100000"/>
               <a:buChar char="-"/>
             </a:pPr>
             <a:r>
@@ -14557,6 +14547,7 @@
               <a:spcAft>
                 <a:spcPts val="0"/>
               </a:spcAft>
+              <a:buSzPct val="100000"/>
               <a:buChar char="-"/>
             </a:pPr>
             <a:r>
@@ -14572,11 +14563,12 @@
               <a:spcAft>
                 <a:spcPts val="0"/>
               </a:spcAft>
+              <a:buSzPct val="100000"/>
               <a:buChar char="-"/>
             </a:pPr>
             <a:r>
               <a:rPr lang="en"/>
-              <a:t>Events (Broncos, Rockies Games)</a:t>
+              <a:t>Events (Broncos, Rockies Games, Concerts, Raves)</a:t>
             </a:r>
             <a:br>
               <a:rPr lang="en"/>
@@ -14590,6 +14582,7 @@
               <a:spcBef>
                 <a:spcPts val="0"/>
               </a:spcBef>
+              <a:buSzPct val="100000"/>
               <a:buChar char="-"/>
             </a:pPr>
             <a:r>
@@ -14927,6 +14920,40 @@
               </a:rPr>
               <a:t> </a:t>
             </a:r>
+          </a:p>
+          <a:p>
+            <a:pPr lvl="0" rtl="0" algn="l">
+              <a:lnSpc>
+                <a:spcPct val="100000"/>
+              </a:lnSpc>
+              <a:spcBef>
+                <a:spcPts val="0"/>
+              </a:spcBef>
+              <a:buNone/>
+            </a:pPr>
+            <a:r>
+              <a:t/>
+            </a:r>
+            <a:endParaRPr sz="1800" u="sng">
+              <a:solidFill>
+                <a:schemeClr val="hlink"/>
+              </a:solidFill>
+              <a:latin typeface="Calibri"/>
+              <a:ea typeface="Calibri"/>
+              <a:cs typeface="Calibri"/>
+              <a:sym typeface="Calibri"/>
+            </a:endParaRPr>
+          </a:p>
+          <a:p>
+            <a:pPr lvl="0" rtl="0" algn="l">
+              <a:lnSpc>
+                <a:spcPct val="100000"/>
+              </a:lnSpc>
+              <a:spcBef>
+                <a:spcPts val="0"/>
+              </a:spcBef>
+              <a:buNone/>
+            </a:pPr>
             <a:br>
               <a:rPr lang="en" sz="1800" u="sng">
                 <a:solidFill>
@@ -15113,41 +15140,6 @@
                   <a:srgbClr val="000000"/>
                 </a:solidFill>
               </a:rPr>
-              <a:t>Which Algorithm</a:t>
-            </a:r>
-            <a:r>
-              <a:rPr lang="en" sz="900">
-                <a:solidFill>
-                  <a:srgbClr val="000000"/>
-                </a:solidFill>
-              </a:rPr>
-              <a:t>:  </a:t>
-            </a:r>
-            <a:r>
-              <a:rPr lang="en" sz="900" u="sng">
-                <a:solidFill>
-                  <a:schemeClr val="hlink"/>
-                </a:solidFill>
-              </a:rPr>
-              <a:t>https://blog.statsbot.co/machine-learning-algorithms-183cc73197c</a:t>
-            </a:r>
-          </a:p>
-          <a:p>
-            <a:pPr lvl="0" rtl="0" algn="l">
-              <a:lnSpc>
-                <a:spcPct val="100000"/>
-              </a:lnSpc>
-              <a:spcBef>
-                <a:spcPts val="0"/>
-              </a:spcBef>
-              <a:buNone/>
-            </a:pPr>
-            <a:r>
-              <a:rPr b="1" lang="en" sz="900">
-                <a:solidFill>
-                  <a:srgbClr val="000000"/>
-                </a:solidFill>
-              </a:rPr>
               <a:t>Denver Crime Stats Home : </a:t>
             </a:r>
             <a:r>
@@ -15262,7 +15254,7 @@
         </p:blipFill>
         <p:spPr>
           <a:xfrm>
-            <a:off x="6858950" y="2128575"/>
+            <a:off x="4972775" y="1717750"/>
             <a:ext cx="1804775" cy="543100"/>
           </a:xfrm>
           <a:prstGeom prst="rect">
@@ -15290,7 +15282,7 @@
         </p:blipFill>
         <p:spPr>
           <a:xfrm>
-            <a:off x="5986275" y="541175"/>
+            <a:off x="362550" y="1775450"/>
             <a:ext cx="2891826" cy="485400"/>
           </a:xfrm>
           <a:prstGeom prst="rect">
@@ -15369,24 +15361,16 @@
                   <a:srgbClr val="000000"/>
                 </a:solidFill>
               </a:rPr>
-              <a:t>Linksgm</a:t>
+              <a:t>More </a:t>
             </a:r>
-          </a:p>
-          <a:p>
-            <a:pPr lvl="0">
-              <a:spcBef>
-                <a:spcPts val="0"/>
-              </a:spcBef>
-              <a:buNone/>
-            </a:pPr>
             <a:r>
-              <a:t/>
+              <a:rPr lang="en" sz="2400">
+                <a:solidFill>
+                  <a:srgbClr val="000000"/>
+                </a:solidFill>
+              </a:rPr>
+              <a:t>Links</a:t>
             </a:r>
-            <a:endParaRPr sz="2400">
-              <a:solidFill>
-                <a:srgbClr val="000000"/>
-              </a:solidFill>
-            </a:endParaRPr>
           </a:p>
         </p:txBody>
       </p:sp>
@@ -15454,6 +15438,41 @@
                 </a:solidFill>
               </a:rPr>
               <a:t> </a:t>
+            </a:r>
+          </a:p>
+          <a:p>
+            <a:pPr lvl="0" rtl="0" algn="l">
+              <a:lnSpc>
+                <a:spcPct val="100000"/>
+              </a:lnSpc>
+              <a:spcBef>
+                <a:spcPts val="0"/>
+              </a:spcBef>
+              <a:buNone/>
+            </a:pPr>
+            <a:r>
+              <a:rPr b="1" lang="en" sz="900">
+                <a:solidFill>
+                  <a:srgbClr val="000000"/>
+                </a:solidFill>
+              </a:rPr>
+              <a:t>Which Algorithm</a:t>
+            </a:r>
+            <a:r>
+              <a:rPr lang="en" sz="900">
+                <a:solidFill>
+                  <a:srgbClr val="000000"/>
+                </a:solidFill>
+              </a:rPr>
+              <a:t>:  </a:t>
+            </a:r>
+            <a:r>
+              <a:rPr lang="en" sz="900" u="sng">
+                <a:solidFill>
+                  <a:schemeClr val="accent5"/>
+                </a:solidFill>
+              </a:rPr>
+              <a:t>https://blog.statsbot.co/machine-learning-algorithms-183cc73197c</a:t>
             </a:r>
           </a:p>
           <a:p>
@@ -15911,8 +15930,8 @@
               <a:buNone/>
             </a:pPr>
             <a:r>
-              <a:rPr lang="en"/>
-              <a:t>Most Data Science is presented as so hard it’s unusable w/o a huge team </a:t>
+              <a:rPr lang="en" sz="2600"/>
+              <a:t>Most Data Science is presented as so hard it’s unusable w/o a huge team of PHDs</a:t>
             </a:r>
           </a:p>
         </p:txBody>

</xml_diff>